<commit_message>
simplify architecture, support only required capacities
</commit_message>
<xml_diff>
--- a/images/aws_architecture.pptx
+++ b/images/aws_architecture.pptx
@@ -259,7 +259,7 @@
           <a:p>
             <a:fld id="{42AC6DE8-5C89-714B-A3A1-F7E061897443}" type="datetimeFigureOut">
               <a:rPr lang="en-US" smtClean="0"/>
-              <a:t>9/13/20</a:t>
+              <a:t>9/7/21</a:t>
             </a:fld>
             <a:endParaRPr lang="en-US"/>
           </a:p>
@@ -457,7 +457,7 @@
           <a:p>
             <a:fld id="{42AC6DE8-5C89-714B-A3A1-F7E061897443}" type="datetimeFigureOut">
               <a:rPr lang="en-US" smtClean="0"/>
-              <a:t>9/13/20</a:t>
+              <a:t>9/7/21</a:t>
             </a:fld>
             <a:endParaRPr lang="en-US"/>
           </a:p>
@@ -665,7 +665,7 @@
           <a:p>
             <a:fld id="{42AC6DE8-5C89-714B-A3A1-F7E061897443}" type="datetimeFigureOut">
               <a:rPr lang="en-US" smtClean="0"/>
-              <a:t>9/13/20</a:t>
+              <a:t>9/7/21</a:t>
             </a:fld>
             <a:endParaRPr lang="en-US"/>
           </a:p>
@@ -863,7 +863,7 @@
           <a:p>
             <a:fld id="{42AC6DE8-5C89-714B-A3A1-F7E061897443}" type="datetimeFigureOut">
               <a:rPr lang="en-US" smtClean="0"/>
-              <a:t>9/13/20</a:t>
+              <a:t>9/7/21</a:t>
             </a:fld>
             <a:endParaRPr lang="en-US"/>
           </a:p>
@@ -1138,7 +1138,7 @@
           <a:p>
             <a:fld id="{42AC6DE8-5C89-714B-A3A1-F7E061897443}" type="datetimeFigureOut">
               <a:rPr lang="en-US" smtClean="0"/>
-              <a:t>9/13/20</a:t>
+              <a:t>9/7/21</a:t>
             </a:fld>
             <a:endParaRPr lang="en-US"/>
           </a:p>
@@ -1403,7 +1403,7 @@
           <a:p>
             <a:fld id="{42AC6DE8-5C89-714B-A3A1-F7E061897443}" type="datetimeFigureOut">
               <a:rPr lang="en-US" smtClean="0"/>
-              <a:t>9/13/20</a:t>
+              <a:t>9/7/21</a:t>
             </a:fld>
             <a:endParaRPr lang="en-US"/>
           </a:p>
@@ -1815,7 +1815,7 @@
           <a:p>
             <a:fld id="{42AC6DE8-5C89-714B-A3A1-F7E061897443}" type="datetimeFigureOut">
               <a:rPr lang="en-US" smtClean="0"/>
-              <a:t>9/13/20</a:t>
+              <a:t>9/7/21</a:t>
             </a:fld>
             <a:endParaRPr lang="en-US"/>
           </a:p>
@@ -1956,7 +1956,7 @@
           <a:p>
             <a:fld id="{42AC6DE8-5C89-714B-A3A1-F7E061897443}" type="datetimeFigureOut">
               <a:rPr lang="en-US" smtClean="0"/>
-              <a:t>9/13/20</a:t>
+              <a:t>9/7/21</a:t>
             </a:fld>
             <a:endParaRPr lang="en-US"/>
           </a:p>
@@ -2069,7 +2069,7 @@
           <a:p>
             <a:fld id="{42AC6DE8-5C89-714B-A3A1-F7E061897443}" type="datetimeFigureOut">
               <a:rPr lang="en-US" smtClean="0"/>
-              <a:t>9/13/20</a:t>
+              <a:t>9/7/21</a:t>
             </a:fld>
             <a:endParaRPr lang="en-US"/>
           </a:p>
@@ -2380,7 +2380,7 @@
           <a:p>
             <a:fld id="{42AC6DE8-5C89-714B-A3A1-F7E061897443}" type="datetimeFigureOut">
               <a:rPr lang="en-US" smtClean="0"/>
-              <a:t>9/13/20</a:t>
+              <a:t>9/7/21</a:t>
             </a:fld>
             <a:endParaRPr lang="en-US"/>
           </a:p>
@@ -2668,7 +2668,7 @@
           <a:p>
             <a:fld id="{42AC6DE8-5C89-714B-A3A1-F7E061897443}" type="datetimeFigureOut">
               <a:rPr lang="en-US" smtClean="0"/>
-              <a:t>9/13/20</a:t>
+              <a:t>9/7/21</a:t>
             </a:fld>
             <a:endParaRPr lang="en-US"/>
           </a:p>
@@ -2909,7 +2909,7 @@
           <a:p>
             <a:fld id="{42AC6DE8-5C89-714B-A3A1-F7E061897443}" type="datetimeFigureOut">
               <a:rPr lang="en-US" smtClean="0"/>
-              <a:t>9/13/20</a:t>
+              <a:t>9/7/21</a:t>
             </a:fld>
             <a:endParaRPr lang="en-US"/>
           </a:p>
@@ -3815,80 +3815,6 @@
           </a:prstGeom>
         </p:spPr>
       </p:pic>
-      <p:sp>
-        <p:nvSpPr>
-          <p:cNvPr id="42" name="TextBox 41">
-            <a:extLst>
-              <a:ext uri="{FF2B5EF4-FFF2-40B4-BE49-F238E27FC236}">
-                <a16:creationId xmlns:a16="http://schemas.microsoft.com/office/drawing/2014/main" id="{4C44B83B-BEFC-D242-821C-AE527A6B1C6B}"/>
-              </a:ext>
-            </a:extLst>
-          </p:cNvPr>
-          <p:cNvSpPr txBox="1"/>
-          <p:nvPr/>
-        </p:nvSpPr>
-        <p:spPr>
-          <a:xfrm>
-            <a:off x="9669172" y="1644366"/>
-            <a:ext cx="2301904" cy="307777"/>
-          </a:xfrm>
-          <a:prstGeom prst="rect">
-            <a:avLst/>
-          </a:prstGeom>
-          <a:noFill/>
-        </p:spPr>
-        <p:txBody>
-          <a:bodyPr wrap="square" rtlCol="0">
-            <a:spAutoFit/>
-          </a:bodyPr>
-          <a:lstStyle/>
-          <a:p>
-            <a:pPr algn="ctr"/>
-            <a:r>
-              <a:rPr lang="en-US" sz="1400" dirty="0">
-                <a:latin typeface="+mj-lt"/>
-              </a:rPr>
-              <a:t>AWS Secrets Manager</a:t>
-            </a:r>
-          </a:p>
-        </p:txBody>
-      </p:sp>
-      <p:pic>
-        <p:nvPicPr>
-          <p:cNvPr id="43" name="Graphic 42">
-            <a:extLst>
-              <a:ext uri="{FF2B5EF4-FFF2-40B4-BE49-F238E27FC236}">
-                <a16:creationId xmlns:a16="http://schemas.microsoft.com/office/drawing/2014/main" id="{65E21F95-F8A0-A94B-9CCF-93CC215923B1}"/>
-              </a:ext>
-            </a:extLst>
-          </p:cNvPr>
-          <p:cNvPicPr>
-            <a:picLocks noChangeAspect="1"/>
-          </p:cNvPicPr>
-          <p:nvPr/>
-        </p:nvPicPr>
-        <p:blipFill>
-          <a:blip r:embed="rId14">
-            <a:extLst>
-              <a:ext uri="{96DAC541-7B7A-43D3-8B79-37D633B846F1}">
-                <asvg:svgBlip xmlns:asvg="http://schemas.microsoft.com/office/drawing/2016/SVG/main" r:embed="rId15"/>
-              </a:ext>
-            </a:extLst>
-          </a:blip>
-          <a:stretch>
-            <a:fillRect/>
-          </a:stretch>
-        </p:blipFill>
-        <p:spPr>
-          <a:xfrm>
-            <a:off x="10464524" y="935388"/>
-            <a:ext cx="711200" cy="711200"/>
-          </a:xfrm>
-          <a:prstGeom prst="rect">
-            <a:avLst/>
-          </a:prstGeom>
-        </p:spPr>
-      </p:pic>
       <p:cxnSp>
         <p:nvCxnSpPr>
           <p:cNvPr id="44" name="Straight Arrow Connector 43">
@@ -3985,94 +3911,6 @@
       </p:cxnSp>
       <p:sp>
         <p:nvSpPr>
-          <p:cNvPr id="67" name="Freeform 66">
-            <a:extLst>
-              <a:ext uri="{FF2B5EF4-FFF2-40B4-BE49-F238E27FC236}">
-                <a16:creationId xmlns:a16="http://schemas.microsoft.com/office/drawing/2014/main" id="{F874012F-33DA-B645-A48C-FF70911BE586}"/>
-              </a:ext>
-            </a:extLst>
-          </p:cNvPr>
-          <p:cNvSpPr/>
-          <p:nvPr/>
-        </p:nvSpPr>
-        <p:spPr>
-          <a:xfrm rot="5400000" flipH="1" flipV="1">
-            <a:off x="7408062" y="-214921"/>
-            <a:ext cx="1527521" cy="4585402"/>
-          </a:xfrm>
-          <a:custGeom>
-            <a:avLst/>
-            <a:gdLst>
-              <a:gd name="connsiteX0" fmla="*/ 1371600 w 1371600"/>
-              <a:gd name="connsiteY0" fmla="*/ 711200 h 711200"/>
-              <a:gd name="connsiteX1" fmla="*/ 1371600 w 1371600"/>
-              <a:gd name="connsiteY1" fmla="*/ 0 h 711200"/>
-              <a:gd name="connsiteX2" fmla="*/ 0 w 1371600"/>
-              <a:gd name="connsiteY2" fmla="*/ 0 h 711200"/>
-            </a:gdLst>
-            <a:ahLst/>
-            <a:cxnLst>
-              <a:cxn ang="0">
-                <a:pos x="connsiteX0" y="connsiteY0"/>
-              </a:cxn>
-              <a:cxn ang="0">
-                <a:pos x="connsiteX1" y="connsiteY1"/>
-              </a:cxn>
-              <a:cxn ang="0">
-                <a:pos x="connsiteX2" y="connsiteY2"/>
-              </a:cxn>
-            </a:cxnLst>
-            <a:rect l="l" t="t" r="r" b="b"/>
-            <a:pathLst>
-              <a:path w="1371600" h="711200">
-                <a:moveTo>
-                  <a:pt x="1371600" y="711200"/>
-                </a:moveTo>
-                <a:lnTo>
-                  <a:pt x="1371600" y="0"/>
-                </a:lnTo>
-                <a:lnTo>
-                  <a:pt x="0" y="0"/>
-                </a:lnTo>
-              </a:path>
-            </a:pathLst>
-          </a:custGeom>
-          <a:noFill/>
-          <a:ln w="12700">
-            <a:solidFill>
-              <a:schemeClr val="tx2"/>
-            </a:solidFill>
-            <a:headEnd type="none" w="med" len="sm"/>
-            <a:tailEnd type="arrow" w="med" len="sm"/>
-          </a:ln>
-        </p:spPr>
-        <p:style>
-          <a:lnRef idx="2">
-            <a:schemeClr val="accent1">
-              <a:shade val="50000"/>
-            </a:schemeClr>
-          </a:lnRef>
-          <a:fillRef idx="1">
-            <a:schemeClr val="accent1"/>
-          </a:fillRef>
-          <a:effectRef idx="0">
-            <a:schemeClr val="accent1"/>
-          </a:effectRef>
-          <a:fontRef idx="minor">
-            <a:schemeClr val="lt1"/>
-          </a:fontRef>
-        </p:style>
-        <p:txBody>
-          <a:bodyPr rtlCol="0" anchor="ctr"/>
-          <a:lstStyle/>
-          <a:p>
-            <a:pPr algn="ctr"/>
-            <a:endParaRPr lang="en-US"/>
-          </a:p>
-        </p:txBody>
-      </p:sp>
-      <p:sp>
-        <p:nvSpPr>
           <p:cNvPr id="69" name="Title 1">
             <a:extLst>
               <a:ext uri="{FF2B5EF4-FFF2-40B4-BE49-F238E27FC236}">
@@ -4177,10 +4015,10 @@
           <p:nvPr/>
         </p:nvPicPr>
         <p:blipFill>
-          <a:blip r:embed="rId16">
+          <a:blip r:embed="rId14">
             <a:extLst>
               <a:ext uri="{96DAC541-7B7A-43D3-8B79-37D633B846F1}">
-                <asvg:svgBlip xmlns:asvg="http://schemas.microsoft.com/office/drawing/2016/SVG/main" r:embed="rId17"/>
+                <asvg:svgBlip xmlns:asvg="http://schemas.microsoft.com/office/drawing/2016/SVG/main" r:embed="rId15"/>
               </a:ext>
             </a:extLst>
           </a:blip>
@@ -4301,7 +4139,7 @@
           <p:nvPr/>
         </p:nvPicPr>
         <p:blipFill>
-          <a:blip r:embed="rId18">
+          <a:blip r:embed="rId16">
             <a:extLst>
               <a:ext uri="{28A0092B-C50C-407E-A947-70E740481C1C}">
                 <a14:useLocalDpi xmlns:a14="http://schemas.microsoft.com/office/drawing/2010/main" val="0"/>
@@ -4395,10 +4233,10 @@
           <p:nvPr/>
         </p:nvPicPr>
         <p:blipFill>
-          <a:blip r:embed="rId19">
+          <a:blip r:embed="rId17">
             <a:extLst>
               <a:ext uri="{96DAC541-7B7A-43D3-8B79-37D633B846F1}">
-                <asvg:svgBlip xmlns:asvg="http://schemas.microsoft.com/office/drawing/2016/SVG/main" r:embed="rId20"/>
+                <asvg:svgBlip xmlns:asvg="http://schemas.microsoft.com/office/drawing/2016/SVG/main" r:embed="rId18"/>
               </a:ext>
             </a:extLst>
           </a:blip>
@@ -4675,242 +4513,6 @@
           </a:fontRef>
         </p:style>
       </p:cxnSp>
-      <p:sp>
-        <p:nvSpPr>
-          <p:cNvPr id="36" name="TextBox 35">
-            <a:extLst>
-              <a:ext uri="{FF2B5EF4-FFF2-40B4-BE49-F238E27FC236}">
-                <a16:creationId xmlns:a16="http://schemas.microsoft.com/office/drawing/2014/main" id="{66AFE7F5-C0E8-B947-9700-320A97361DC9}"/>
-              </a:ext>
-            </a:extLst>
-          </p:cNvPr>
-          <p:cNvSpPr txBox="1"/>
-          <p:nvPr/>
-        </p:nvSpPr>
-        <p:spPr>
-          <a:xfrm>
-            <a:off x="9722607" y="5316351"/>
-            <a:ext cx="2301904" cy="307777"/>
-          </a:xfrm>
-          <a:prstGeom prst="rect">
-            <a:avLst/>
-          </a:prstGeom>
-          <a:noFill/>
-        </p:spPr>
-        <p:txBody>
-          <a:bodyPr wrap="square" rtlCol="0">
-            <a:spAutoFit/>
-          </a:bodyPr>
-          <a:lstStyle/>
-          <a:p>
-            <a:pPr algn="ctr"/>
-            <a:r>
-              <a:rPr lang="en-US" sz="1400" dirty="0"/>
-              <a:t>AWS CloudFormation</a:t>
-            </a:r>
-          </a:p>
-        </p:txBody>
-      </p:sp>
-      <p:pic>
-        <p:nvPicPr>
-          <p:cNvPr id="41" name="Graphic 40">
-            <a:extLst>
-              <a:ext uri="{FF2B5EF4-FFF2-40B4-BE49-F238E27FC236}">
-                <a16:creationId xmlns:a16="http://schemas.microsoft.com/office/drawing/2014/main" id="{E9620B42-8709-4748-AC44-1A77EB8D0472}"/>
-              </a:ext>
-            </a:extLst>
-          </p:cNvPr>
-          <p:cNvPicPr>
-            <a:picLocks noChangeAspect="1"/>
-          </p:cNvPicPr>
-          <p:nvPr/>
-        </p:nvPicPr>
-        <p:blipFill>
-          <a:blip r:embed="rId21">
-            <a:extLst>
-              <a:ext uri="{96DAC541-7B7A-43D3-8B79-37D633B846F1}">
-                <asvg:svgBlip xmlns:asvg="http://schemas.microsoft.com/office/drawing/2016/SVG/main" r:embed="rId22"/>
-              </a:ext>
-            </a:extLst>
-          </a:blip>
-          <a:stretch>
-            <a:fillRect/>
-          </a:stretch>
-        </p:blipFill>
-        <p:spPr>
-          <a:xfrm>
-            <a:off x="10517959" y="4605151"/>
-            <a:ext cx="711200" cy="711200"/>
-          </a:xfrm>
-          <a:prstGeom prst="rect">
-            <a:avLst/>
-          </a:prstGeom>
-        </p:spPr>
-      </p:pic>
-      <p:sp>
-        <p:nvSpPr>
-          <p:cNvPr id="34" name="TextBox 33">
-            <a:extLst>
-              <a:ext uri="{FF2B5EF4-FFF2-40B4-BE49-F238E27FC236}">
-                <a16:creationId xmlns:a16="http://schemas.microsoft.com/office/drawing/2014/main" id="{B8E4948A-5EFB-F84B-907D-A79A0F9393B9}"/>
-              </a:ext>
-            </a:extLst>
-          </p:cNvPr>
-          <p:cNvSpPr txBox="1"/>
-          <p:nvPr/>
-        </p:nvSpPr>
-        <p:spPr>
-          <a:xfrm>
-            <a:off x="3351488" y="2291512"/>
-            <a:ext cx="2217871" cy="523220"/>
-          </a:xfrm>
-          <a:prstGeom prst="rect">
-            <a:avLst/>
-          </a:prstGeom>
-          <a:noFill/>
-        </p:spPr>
-        <p:txBody>
-          <a:bodyPr wrap="square" rtlCol="0">
-            <a:spAutoFit/>
-          </a:bodyPr>
-          <a:lstStyle/>
-          <a:p>
-            <a:pPr algn="ctr"/>
-            <a:r>
-              <a:rPr lang="en-US" sz="1400" dirty="0">
-                <a:latin typeface="+mj-lt"/>
-                <a:ea typeface="Amazon Ember" panose="020B0603020204020204" pitchFamily="34" charset="0"/>
-                <a:cs typeface="Amazon Ember" panose="020B0603020204020204" pitchFamily="34" charset="0"/>
-              </a:rPr>
-              <a:t>Amazon Simple Notification Service</a:t>
-            </a:r>
-          </a:p>
-        </p:txBody>
-      </p:sp>
-      <p:pic>
-        <p:nvPicPr>
-          <p:cNvPr id="40" name="Graphic 39">
-            <a:extLst>
-              <a:ext uri="{FF2B5EF4-FFF2-40B4-BE49-F238E27FC236}">
-                <a16:creationId xmlns:a16="http://schemas.microsoft.com/office/drawing/2014/main" id="{F3E9489A-346F-AC4C-98D6-824CAAD7F1D4}"/>
-              </a:ext>
-            </a:extLst>
-          </p:cNvPr>
-          <p:cNvPicPr>
-            <a:picLocks noChangeAspect="1"/>
-          </p:cNvPicPr>
-          <p:nvPr/>
-        </p:nvPicPr>
-        <p:blipFill>
-          <a:blip r:embed="rId23">
-            <a:extLst>
-              <a:ext uri="{96DAC541-7B7A-43D3-8B79-37D633B846F1}">
-                <asvg:svgBlip xmlns:asvg="http://schemas.microsoft.com/office/drawing/2016/SVG/main" r:embed="rId24"/>
-              </a:ext>
-            </a:extLst>
-          </a:blip>
-          <a:stretch>
-            <a:fillRect/>
-          </a:stretch>
-        </p:blipFill>
-        <p:spPr>
-          <a:xfrm>
-            <a:off x="4111015" y="1596543"/>
-            <a:ext cx="711200" cy="711200"/>
-          </a:xfrm>
-          <a:prstGeom prst="rect">
-            <a:avLst/>
-          </a:prstGeom>
-        </p:spPr>
-      </p:pic>
-      <p:sp>
-        <p:nvSpPr>
-          <p:cNvPr id="47" name="Freeform 46">
-            <a:extLst>
-              <a:ext uri="{FF2B5EF4-FFF2-40B4-BE49-F238E27FC236}">
-                <a16:creationId xmlns:a16="http://schemas.microsoft.com/office/drawing/2014/main" id="{5B25CE66-1EFB-0B4F-B331-4A11545960FA}"/>
-              </a:ext>
-            </a:extLst>
-          </p:cNvPr>
-          <p:cNvSpPr/>
-          <p:nvPr/>
-        </p:nvSpPr>
-        <p:spPr>
-          <a:xfrm rot="10800000" flipH="1" flipV="1">
-            <a:off x="4810388" y="1952143"/>
-            <a:ext cx="940563" cy="889396"/>
-          </a:xfrm>
-          <a:custGeom>
-            <a:avLst/>
-            <a:gdLst>
-              <a:gd name="connsiteX0" fmla="*/ 1371600 w 1371600"/>
-              <a:gd name="connsiteY0" fmla="*/ 711200 h 711200"/>
-              <a:gd name="connsiteX1" fmla="*/ 1371600 w 1371600"/>
-              <a:gd name="connsiteY1" fmla="*/ 0 h 711200"/>
-              <a:gd name="connsiteX2" fmla="*/ 0 w 1371600"/>
-              <a:gd name="connsiteY2" fmla="*/ 0 h 711200"/>
-            </a:gdLst>
-            <a:ahLst/>
-            <a:cxnLst>
-              <a:cxn ang="0">
-                <a:pos x="connsiteX0" y="connsiteY0"/>
-              </a:cxn>
-              <a:cxn ang="0">
-                <a:pos x="connsiteX1" y="connsiteY1"/>
-              </a:cxn>
-              <a:cxn ang="0">
-                <a:pos x="connsiteX2" y="connsiteY2"/>
-              </a:cxn>
-            </a:cxnLst>
-            <a:rect l="l" t="t" r="r" b="b"/>
-            <a:pathLst>
-              <a:path w="1371600" h="711200">
-                <a:moveTo>
-                  <a:pt x="1371600" y="711200"/>
-                </a:moveTo>
-                <a:lnTo>
-                  <a:pt x="1371600" y="0"/>
-                </a:lnTo>
-                <a:lnTo>
-                  <a:pt x="0" y="0"/>
-                </a:lnTo>
-              </a:path>
-            </a:pathLst>
-          </a:custGeom>
-          <a:noFill/>
-          <a:ln w="12700">
-            <a:solidFill>
-              <a:schemeClr val="tx2"/>
-            </a:solidFill>
-            <a:headEnd type="none" w="med" len="sm"/>
-            <a:tailEnd type="arrow" w="med" len="sm"/>
-          </a:ln>
-        </p:spPr>
-        <p:style>
-          <a:lnRef idx="2">
-            <a:schemeClr val="accent1">
-              <a:shade val="50000"/>
-            </a:schemeClr>
-          </a:lnRef>
-          <a:fillRef idx="1">
-            <a:schemeClr val="accent1"/>
-          </a:fillRef>
-          <a:effectRef idx="0">
-            <a:schemeClr val="accent1"/>
-          </a:effectRef>
-          <a:fontRef idx="minor">
-            <a:schemeClr val="lt1"/>
-          </a:fontRef>
-        </p:style>
-        <p:txBody>
-          <a:bodyPr rtlCol="0" anchor="ctr"/>
-          <a:lstStyle/>
-          <a:p>
-            <a:pPr algn="ctr"/>
-            <a:endParaRPr lang="en-US"/>
-          </a:p>
-        </p:txBody>
-      </p:sp>
     </p:spTree>
     <p:extLst>
       <p:ext uri="{BB962C8B-B14F-4D97-AF65-F5344CB8AC3E}">

</xml_diff>